<commit_message>
updated document for task 1
</commit_message>
<xml_diff>
--- a/TASK1/Task1_document.pptx
+++ b/TASK1/Task1_document.pptx
@@ -3989,7 +3989,7 @@
       </p:sp>
       <p:pic>
         <p:nvPicPr>
-          <p:cNvPr id="2" name="Picture 1" descr="Screenshot (40)"/>
+          <p:cNvPr id="4" name="Picture 3" descr="Screenshot (61)"/>
           <p:cNvPicPr>
             <a:picLocks noChangeAspect="1"/>
           </p:cNvPicPr>
@@ -3997,21 +3997,68 @@
         </p:nvPicPr>
         <p:blipFill>
           <a:blip r:embed="rId1"/>
-          <a:srcRect t="-191"/>
+          <a:srcRect l="706" t="4537" r="15871" b="23223"/>
           <a:stretch>
             <a:fillRect/>
           </a:stretch>
         </p:blipFill>
         <p:spPr>
           <a:xfrm>
-            <a:off x="1391920" y="1322705"/>
-            <a:ext cx="9407525" cy="5299075"/>
+            <a:off x="981710" y="1500505"/>
+            <a:ext cx="10228580" cy="4979670"/>
           </a:xfrm>
           <a:prstGeom prst="rect">
             <a:avLst/>
           </a:prstGeom>
         </p:spPr>
       </p:pic>
+      <p:sp>
+        <p:nvSpPr>
+          <p:cNvPr id="5" name="Right Arrow 4"/>
+          <p:cNvSpPr/>
+          <p:nvPr/>
+        </p:nvSpPr>
+        <p:spPr>
+          <a:xfrm rot="17580000">
+            <a:off x="2921000" y="2830195"/>
+            <a:ext cx="829945" cy="129540"/>
+          </a:xfrm>
+          <a:prstGeom prst="rightArrow">
+            <a:avLst>
+              <a:gd name="adj1" fmla="val 85434"/>
+              <a:gd name="adj2" fmla="val 102240"/>
+            </a:avLst>
+          </a:prstGeom>
+          <a:solidFill>
+            <a:schemeClr val="bg2">
+              <a:lumMod val="75000"/>
+            </a:schemeClr>
+          </a:solidFill>
+        </p:spPr>
+        <p:style>
+          <a:lnRef idx="2">
+            <a:schemeClr val="accent1">
+              <a:shade val="50000"/>
+            </a:schemeClr>
+          </a:lnRef>
+          <a:fillRef idx="1">
+            <a:schemeClr val="accent1"/>
+          </a:fillRef>
+          <a:effectRef idx="0">
+            <a:schemeClr val="accent1"/>
+          </a:effectRef>
+          <a:fontRef idx="minor">
+            <a:schemeClr val="lt1"/>
+          </a:fontRef>
+        </p:style>
+        <p:txBody>
+          <a:bodyPr rtlCol="0" anchor="ctr"/>
+          <a:p>
+            <a:pPr algn="ctr"/>
+            <a:endParaRPr lang="en-US"/>
+          </a:p>
+        </p:txBody>
+      </p:sp>
     </p:spTree>
   </p:cSld>
   <p:clrMapOvr>

</xml_diff>